<commit_message>
moved registration to seperate page
</commit_message>
<xml_diff>
--- a/slides/django_slides.pptx
+++ b/slides/django_slides.pptx
@@ -14509,9 +14509,7 @@
             <a:r>
               <a:rPr lang="en-US" dirty="0">
                 <a:solidFill>
-                  <a:schemeClr val="bg1">
-                    <a:lumMod val="75000"/>
-                  </a:schemeClr>
+                  <a:srgbClr val="BFBFBF"/>
                 </a:solidFill>
                 <a:latin typeface="Consolas"/>
                 <a:cs typeface="Consolas"/>
@@ -14521,9 +14519,7 @@
             <a:r>
               <a:rPr lang="en-US" dirty="0" err="1">
                 <a:solidFill>
-                  <a:schemeClr val="bg1">
-                    <a:lumMod val="95000"/>
-                  </a:schemeClr>
+                  <a:srgbClr val="BFBFBF"/>
                 </a:solidFill>
                 <a:latin typeface="Consolas"/>
                 <a:cs typeface="Consolas"/>
@@ -14533,9 +14529,7 @@
             <a:r>
               <a:rPr lang="en-US" dirty="0">
                 <a:solidFill>
-                  <a:schemeClr val="bg1">
-                    <a:lumMod val="95000"/>
-                  </a:schemeClr>
+                  <a:srgbClr val="BFBFBF"/>
                 </a:solidFill>
                 <a:latin typeface="Consolas"/>
                 <a:cs typeface="Consolas"/>
@@ -14545,9 +14539,7 @@
             <a:r>
               <a:rPr lang="en-US" dirty="0" err="1">
                 <a:solidFill>
-                  <a:schemeClr val="bg1">
-                    <a:lumMod val="95000"/>
-                  </a:schemeClr>
+                  <a:srgbClr val="BFBFBF"/>
                 </a:solidFill>
                 <a:latin typeface="Consolas"/>
                 <a:cs typeface="Consolas"/>
@@ -14557,26 +14549,12 @@
             <a:r>
               <a:rPr lang="en-US" dirty="0">
                 <a:solidFill>
-                  <a:schemeClr val="bg1">
-                    <a:lumMod val="95000"/>
-                  </a:schemeClr>
-                </a:solidFill>
-                <a:latin typeface="Consolas"/>
-                <a:cs typeface="Consolas"/>
-              </a:rPr>
-              <a:t>', name='home')</a:t>
-            </a:r>
-            <a:r>
-              <a:rPr lang="en-US" dirty="0">
-                <a:solidFill>
-                  <a:schemeClr val="bg1">
-                    <a:lumMod val="75000"/>
-                  </a:schemeClr>
-                </a:solidFill>
-                <a:latin typeface="Consolas"/>
-                <a:cs typeface="Consolas"/>
-              </a:rPr>
-              <a:t>,</a:t>
+                  <a:srgbClr val="BFBFBF"/>
+                </a:solidFill>
+                <a:latin typeface="Consolas"/>
+                <a:cs typeface="Consolas"/>
+              </a:rPr>
+              <a:t>', name='home'),</a:t>
             </a:r>
           </a:p>
           <a:p>
@@ -14882,7 +14860,7 @@
                 <a:latin typeface="Consolas"/>
                 <a:cs typeface="Consolas"/>
               </a:rPr>
-              <a:t> &lt;- matches r’^$’</a:t>
+              <a:t> &lt;- matches ’^$’</a:t>
             </a:r>
             <a:endParaRPr lang="en-US" dirty="0">
               <a:solidFill>

</xml_diff>